<commit_message>
Agregamos varios archivos, en cada uno se realizaron las pruebas de funciones deperdida, activacion, cantidad de neuronas y en el estado actual estan las mejores opciones en cada area
</commit_message>
<xml_diff>
--- a/puntos/punto 4/punto_4.pptx
+++ b/puntos/punto 4/punto_4.pptx
@@ -338,7 +338,7 @@
           <a:p>
             <a:fld id="{C70CF37E-474B-499C-8226-9C64EE254432}" type="datetimeFigureOut">
               <a:rPr lang="es-CO" smtClean="0"/>
-              <a:t>28/10/2023</a:t>
+              <a:t>1/11/2023</a:t>
             </a:fld>
             <a:endParaRPr lang="es-CO"/>
           </a:p>
@@ -508,7 +508,7 @@
           <a:p>
             <a:fld id="{C70CF37E-474B-499C-8226-9C64EE254432}" type="datetimeFigureOut">
               <a:rPr lang="es-CO" smtClean="0"/>
-              <a:t>28/10/2023</a:t>
+              <a:t>1/11/2023</a:t>
             </a:fld>
             <a:endParaRPr lang="es-CO"/>
           </a:p>
@@ -688,7 +688,7 @@
           <a:p>
             <a:fld id="{C70CF37E-474B-499C-8226-9C64EE254432}" type="datetimeFigureOut">
               <a:rPr lang="es-CO" smtClean="0"/>
-              <a:t>28/10/2023</a:t>
+              <a:t>1/11/2023</a:t>
             </a:fld>
             <a:endParaRPr lang="es-CO"/>
           </a:p>
@@ -858,7 +858,7 @@
           <a:p>
             <a:fld id="{C70CF37E-474B-499C-8226-9C64EE254432}" type="datetimeFigureOut">
               <a:rPr lang="es-CO" smtClean="0"/>
-              <a:t>28/10/2023</a:t>
+              <a:t>1/11/2023</a:t>
             </a:fld>
             <a:endParaRPr lang="es-CO"/>
           </a:p>
@@ -1116,7 +1116,7 @@
           <a:p>
             <a:fld id="{C70CF37E-474B-499C-8226-9C64EE254432}" type="datetimeFigureOut">
               <a:rPr lang="es-CO" smtClean="0"/>
-              <a:t>28/10/2023</a:t>
+              <a:t>1/11/2023</a:t>
             </a:fld>
             <a:endParaRPr lang="es-CO"/>
           </a:p>
@@ -1404,7 +1404,7 @@
           <a:p>
             <a:fld id="{C70CF37E-474B-499C-8226-9C64EE254432}" type="datetimeFigureOut">
               <a:rPr lang="es-CO" smtClean="0"/>
-              <a:t>28/10/2023</a:t>
+              <a:t>1/11/2023</a:t>
             </a:fld>
             <a:endParaRPr lang="es-CO"/>
           </a:p>
@@ -1846,7 +1846,7 @@
           <a:p>
             <a:fld id="{C70CF37E-474B-499C-8226-9C64EE254432}" type="datetimeFigureOut">
               <a:rPr lang="es-CO" smtClean="0"/>
-              <a:t>28/10/2023</a:t>
+              <a:t>1/11/2023</a:t>
             </a:fld>
             <a:endParaRPr lang="es-CO"/>
           </a:p>
@@ -1964,7 +1964,7 @@
           <a:p>
             <a:fld id="{C70CF37E-474B-499C-8226-9C64EE254432}" type="datetimeFigureOut">
               <a:rPr lang="es-CO" smtClean="0"/>
-              <a:t>28/10/2023</a:t>
+              <a:t>1/11/2023</a:t>
             </a:fld>
             <a:endParaRPr lang="es-CO"/>
           </a:p>
@@ -2059,7 +2059,7 @@
           <a:p>
             <a:fld id="{C70CF37E-474B-499C-8226-9C64EE254432}" type="datetimeFigureOut">
               <a:rPr lang="es-CO" smtClean="0"/>
-              <a:t>28/10/2023</a:t>
+              <a:t>1/11/2023</a:t>
             </a:fld>
             <a:endParaRPr lang="es-CO"/>
           </a:p>
@@ -2347,7 +2347,7 @@
           <a:p>
             <a:fld id="{C70CF37E-474B-499C-8226-9C64EE254432}" type="datetimeFigureOut">
               <a:rPr lang="es-CO" smtClean="0"/>
-              <a:t>28/10/2023</a:t>
+              <a:t>1/11/2023</a:t>
             </a:fld>
             <a:endParaRPr lang="es-CO"/>
           </a:p>
@@ -2620,7 +2620,7 @@
           <a:p>
             <a:fld id="{C70CF37E-474B-499C-8226-9C64EE254432}" type="datetimeFigureOut">
               <a:rPr lang="es-CO" smtClean="0"/>
-              <a:t>28/10/2023</a:t>
+              <a:t>1/11/2023</a:t>
             </a:fld>
             <a:endParaRPr lang="es-CO"/>
           </a:p>
@@ -2917,7 +2917,7 @@
           <a:p>
             <a:fld id="{C70CF37E-474B-499C-8226-9C64EE254432}" type="datetimeFigureOut">
               <a:rPr lang="es-CO" smtClean="0"/>
-              <a:t>28/10/2023</a:t>
+              <a:t>1/11/2023</a:t>
             </a:fld>
             <a:endParaRPr lang="es-CO"/>
           </a:p>
@@ -3422,7 +3422,14 @@
           <a:p>
             <a:r>
               <a:rPr lang="es-ES" dirty="0"/>
-              <a:t>Punto 3 – redes neuronales </a:t>
+              <a:t>Punto 4 – redes neuronales</a:t>
+            </a:r>
+            <a:br>
+              <a:rPr lang="es-ES" dirty="0"/>
+            </a:br>
+            <a:r>
+              <a:rPr lang="es-ES" dirty="0"/>
+              <a:t>Reporte</a:t>
             </a:r>
             <a:endParaRPr lang="es-CO" dirty="0"/>
           </a:p>
@@ -3518,6 +3525,16 @@
               <a:buChar char="•"/>
             </a:pPr>
             <a:r>
+              <a:rPr lang="es-ES" b="0" i="0" dirty="0" err="1">
+                <a:solidFill>
+                  <a:schemeClr val="bg1"/>
+                </a:solidFill>
+                <a:effectLst/>
+                <a:latin typeface="Roboto" panose="02000000000000000000" pitchFamily="2" charset="0"/>
+              </a:rPr>
+              <a:t>Introduccion</a:t>
+            </a:r>
+            <a:r>
               <a:rPr lang="es-ES" b="0" i="0" dirty="0">
                 <a:solidFill>
                   <a:schemeClr val="bg1"/>
@@ -3525,7 +3542,7 @@
                 <a:effectLst/>
                 <a:latin typeface="Roboto" panose="02000000000000000000" pitchFamily="2" charset="0"/>
               </a:rPr>
-              <a:t>¿Cual es el objetivo de categorizar los targets o labels correspondientes a cada imagen?</a:t>
+              <a:t>:</a:t>
             </a:r>
           </a:p>
         </p:txBody>

</xml_diff>